<commit_message>
v0.1 Training screenshot addition
</commit_message>
<xml_diff>
--- a/Github 101.pptx
+++ b/Github 101.pptx
@@ -6829,11 +6829,7 @@
           <a:p>
             <a:r>
               <a:rPr lang="en-US" sz="2600" dirty="0" smtClean="0"/>
-              <a:t>Create a directory and cd to it</a:t>
-            </a:r>
-            <a:r>
-              <a:rPr lang="en-US" sz="2600" dirty="0" smtClean="0"/>
-              <a:t>.</a:t>
+              <a:t>Create a directory and cd to it.</a:t>
             </a:r>
           </a:p>
           <a:p>
@@ -7363,6 +7359,30 @@
           </a:p>
         </p:txBody>
       </p:sp>
+      <p:pic>
+        <p:nvPicPr>
+          <p:cNvPr id="4" name="Picture 3"/>
+          <p:cNvPicPr>
+            <a:picLocks noChangeAspect="1"/>
+          </p:cNvPicPr>
+          <p:nvPr/>
+        </p:nvPicPr>
+        <p:blipFill>
+          <a:blip r:embed="rId2"/>
+          <a:stretch>
+            <a:fillRect/>
+          </a:stretch>
+        </p:blipFill>
+        <p:spPr>
+          <a:xfrm>
+            <a:off x="5611091" y="2418855"/>
+            <a:ext cx="5985596" cy="4029214"/>
+          </a:xfrm>
+          <a:prstGeom prst="rect">
+            <a:avLst/>
+          </a:prstGeom>
+        </p:spPr>
+      </p:pic>
     </p:spTree>
     <p:extLst>
       <p:ext uri="{BB962C8B-B14F-4D97-AF65-F5344CB8AC3E}">

</xml_diff>